<commit_message>
update figures in submission folder
</commit_message>
<xml_diff>
--- a/figures/figure-small-example/figure3-cycle-no-bg.pptx
+++ b/figures/figure-small-example/figure3-cycle-no-bg.pptx
@@ -222,7 +222,7 @@
           <a:p>
             <a:fld id="{6EB7A7D9-E015-6D42-BCFD-33C7B660C884}" type="datetimeFigureOut">
               <a:rPr lang="en-US" smtClean="0"/>
-              <a:t>8/15/23</a:t>
+              <a:t>10/27/23</a:t>
             </a:fld>
             <a:endParaRPr lang="en-US"/>
           </a:p>
@@ -709,7 +709,7 @@
           <a:p>
             <a:fld id="{B4970447-8C83-B347-8B06-AB59AEB01EEB}" type="datetimeFigureOut">
               <a:rPr lang="en-US" smtClean="0"/>
-              <a:t>8/15/23</a:t>
+              <a:t>10/27/23</a:t>
             </a:fld>
             <a:endParaRPr lang="en-US"/>
           </a:p>
@@ -879,7 +879,7 @@
           <a:p>
             <a:fld id="{B4970447-8C83-B347-8B06-AB59AEB01EEB}" type="datetimeFigureOut">
               <a:rPr lang="en-US" smtClean="0"/>
-              <a:t>8/15/23</a:t>
+              <a:t>10/27/23</a:t>
             </a:fld>
             <a:endParaRPr lang="en-US"/>
           </a:p>
@@ -1059,7 +1059,7 @@
           <a:p>
             <a:fld id="{B4970447-8C83-B347-8B06-AB59AEB01EEB}" type="datetimeFigureOut">
               <a:rPr lang="en-US" smtClean="0"/>
-              <a:t>8/15/23</a:t>
+              <a:t>10/27/23</a:t>
             </a:fld>
             <a:endParaRPr lang="en-US"/>
           </a:p>
@@ -1229,7 +1229,7 @@
           <a:p>
             <a:fld id="{B4970447-8C83-B347-8B06-AB59AEB01EEB}" type="datetimeFigureOut">
               <a:rPr lang="en-US" smtClean="0"/>
-              <a:t>8/15/23</a:t>
+              <a:t>10/27/23</a:t>
             </a:fld>
             <a:endParaRPr lang="en-US"/>
           </a:p>
@@ -1473,7 +1473,7 @@
           <a:p>
             <a:fld id="{B4970447-8C83-B347-8B06-AB59AEB01EEB}" type="datetimeFigureOut">
               <a:rPr lang="en-US" smtClean="0"/>
-              <a:t>8/15/23</a:t>
+              <a:t>10/27/23</a:t>
             </a:fld>
             <a:endParaRPr lang="en-US"/>
           </a:p>
@@ -1705,7 +1705,7 @@
           <a:p>
             <a:fld id="{B4970447-8C83-B347-8B06-AB59AEB01EEB}" type="datetimeFigureOut">
               <a:rPr lang="en-US" smtClean="0"/>
-              <a:t>8/15/23</a:t>
+              <a:t>10/27/23</a:t>
             </a:fld>
             <a:endParaRPr lang="en-US"/>
           </a:p>
@@ -2072,7 +2072,7 @@
           <a:p>
             <a:fld id="{B4970447-8C83-B347-8B06-AB59AEB01EEB}" type="datetimeFigureOut">
               <a:rPr lang="en-US" smtClean="0"/>
-              <a:t>8/15/23</a:t>
+              <a:t>10/27/23</a:t>
             </a:fld>
             <a:endParaRPr lang="en-US"/>
           </a:p>
@@ -2190,7 +2190,7 @@
           <a:p>
             <a:fld id="{B4970447-8C83-B347-8B06-AB59AEB01EEB}" type="datetimeFigureOut">
               <a:rPr lang="en-US" smtClean="0"/>
-              <a:t>8/15/23</a:t>
+              <a:t>10/27/23</a:t>
             </a:fld>
             <a:endParaRPr lang="en-US"/>
           </a:p>
@@ -2285,7 +2285,7 @@
           <a:p>
             <a:fld id="{B4970447-8C83-B347-8B06-AB59AEB01EEB}" type="datetimeFigureOut">
               <a:rPr lang="en-US" smtClean="0"/>
-              <a:t>8/15/23</a:t>
+              <a:t>10/27/23</a:t>
             </a:fld>
             <a:endParaRPr lang="en-US"/>
           </a:p>
@@ -2562,7 +2562,7 @@
           <a:p>
             <a:fld id="{B4970447-8C83-B347-8B06-AB59AEB01EEB}" type="datetimeFigureOut">
               <a:rPr lang="en-US" smtClean="0"/>
-              <a:t>8/15/23</a:t>
+              <a:t>10/27/23</a:t>
             </a:fld>
             <a:endParaRPr lang="en-US"/>
           </a:p>
@@ -2819,7 +2819,7 @@
           <a:p>
             <a:fld id="{B4970447-8C83-B347-8B06-AB59AEB01EEB}" type="datetimeFigureOut">
               <a:rPr lang="en-US" smtClean="0"/>
-              <a:t>8/15/23</a:t>
+              <a:t>10/27/23</a:t>
             </a:fld>
             <a:endParaRPr lang="en-US"/>
           </a:p>
@@ -3032,7 +3032,7 @@
           <a:p>
             <a:fld id="{B4970447-8C83-B347-8B06-AB59AEB01EEB}" type="datetimeFigureOut">
               <a:rPr lang="en-US" smtClean="0"/>
-              <a:t>8/15/23</a:t>
+              <a:t>10/27/23</a:t>
             </a:fld>
             <a:endParaRPr lang="en-US"/>
           </a:p>
@@ -4037,10 +4037,10 @@
         </p:nvGrpSpPr>
         <p:grpSpPr>
           <a:xfrm>
-            <a:off x="275779" y="-1980"/>
-            <a:ext cx="1609715" cy="955846"/>
-            <a:chOff x="-111080" y="-1980"/>
-            <a:chExt cx="1609715" cy="955846"/>
+            <a:off x="-1595989" y="-1980"/>
+            <a:ext cx="3481483" cy="955846"/>
+            <a:chOff x="-1982848" y="-1980"/>
+            <a:chExt cx="3481483" cy="955846"/>
           </a:xfrm>
         </p:grpSpPr>
         <p:sp>
@@ -4149,6 +4149,204 @@
           <p:spPr>
             <a:xfrm>
               <a:off x="53340" y="89355"/>
+              <a:ext cx="1445295" cy="830997"/>
+            </a:xfrm>
+            <a:prstGeom prst="rect">
+              <a:avLst/>
+            </a:prstGeom>
+            <a:noFill/>
+          </p:spPr>
+          <p:txBody>
+            <a:bodyPr wrap="square" rtlCol="0">
+              <a:spAutoFit/>
+            </a:bodyPr>
+            <a:lstStyle/>
+            <a:p>
+              <a:pPr marL="114300" indent="-114300">
+                <a:buSzPct val="150000"/>
+                <a:buFont typeface="Arial" panose="020B0604020202020204" pitchFamily="34" charset="0"/>
+                <a:buChar char="•"/>
+                <a:defRPr/>
+              </a:pPr>
+              <a:r>
+                <a:rPr lang="en-US" sz="800" i="1" dirty="0">
+                  <a:solidFill>
+                    <a:prstClr val="black"/>
+                  </a:solidFill>
+                  <a:latin typeface="Helvetica Light Oblique" panose="020B0403020202020204" pitchFamily="34" charset="0"/>
+                </a:rPr>
+                <a:t>P. tibialis </a:t>
+              </a:r>
+            </a:p>
+            <a:p>
+              <a:pPr marL="114300" indent="-114300">
+                <a:buSzPct val="150000"/>
+                <a:buFont typeface="Arial" panose="020B0604020202020204" pitchFamily="34" charset="0"/>
+                <a:buChar char="•"/>
+                <a:defRPr/>
+              </a:pPr>
+              <a:r>
+                <a:rPr lang="en-US" sz="800" i="1" dirty="0">
+                  <a:solidFill>
+                    <a:prstClr val="black"/>
+                  </a:solidFill>
+                  <a:latin typeface="Helvetica Light Oblique" panose="020B0403020202020204" pitchFamily="34" charset="0"/>
+                </a:rPr>
+                <a:t>R. </a:t>
+              </a:r>
+              <a:r>
+                <a:rPr lang="en-US" sz="800" i="1" dirty="0" err="1">
+                  <a:solidFill>
+                    <a:prstClr val="black"/>
+                  </a:solidFill>
+                  <a:latin typeface="Helvetica Light Oblique" panose="020B0403020202020204" pitchFamily="34" charset="0"/>
+                </a:rPr>
+                <a:t>celaeno</a:t>
+              </a:r>
+              <a:endParaRPr lang="en-US" sz="800" i="1" dirty="0">
+                <a:solidFill>
+                  <a:prstClr val="black"/>
+                </a:solidFill>
+                <a:latin typeface="Helvetica Light Oblique" panose="020B0403020202020204" pitchFamily="34" charset="0"/>
+              </a:endParaRPr>
+            </a:p>
+            <a:p>
+              <a:pPr marL="114300" indent="-114300">
+                <a:buSzPct val="150000"/>
+                <a:buFont typeface="Arial" panose="020B0604020202020204" pitchFamily="34" charset="0"/>
+                <a:buChar char="•"/>
+                <a:defRPr/>
+              </a:pPr>
+              <a:r>
+                <a:rPr lang="en-US" sz="800" i="1" dirty="0">
+                  <a:solidFill>
+                    <a:prstClr val="black"/>
+                  </a:solidFill>
+                  <a:latin typeface="Helvetica Light Oblique" panose="020B0403020202020204" pitchFamily="34" charset="0"/>
+                </a:rPr>
+                <a:t>E. </a:t>
+              </a:r>
+              <a:r>
+                <a:rPr lang="en-US" sz="800" i="1" dirty="0" err="1">
+                  <a:solidFill>
+                    <a:prstClr val="black"/>
+                  </a:solidFill>
+                  <a:latin typeface="Helvetica Light Oblique" panose="020B0403020202020204" pitchFamily="34" charset="0"/>
+                </a:rPr>
+                <a:t>citrinella</a:t>
+              </a:r>
+              <a:endParaRPr lang="en-US" sz="800" i="1" dirty="0">
+                <a:solidFill>
+                  <a:prstClr val="black"/>
+                </a:solidFill>
+                <a:latin typeface="Helvetica Light Oblique" panose="020B0403020202020204" pitchFamily="34" charset="0"/>
+              </a:endParaRPr>
+            </a:p>
+            <a:p>
+              <a:pPr marL="114300" indent="-114300">
+                <a:buSzPct val="150000"/>
+                <a:buFont typeface="Arial" panose="020B0604020202020204" pitchFamily="34" charset="0"/>
+                <a:buChar char="•"/>
+                <a:defRPr/>
+              </a:pPr>
+              <a:r>
+                <a:rPr lang="en-US" sz="800" i="1" dirty="0">
+                  <a:solidFill>
+                    <a:prstClr val="black"/>
+                  </a:solidFill>
+                  <a:latin typeface="Helvetica Light Oblique" panose="020B0403020202020204" pitchFamily="34" charset="0"/>
+                </a:rPr>
+                <a:t>E. </a:t>
+              </a:r>
+              <a:r>
+                <a:rPr lang="en-US" sz="800" i="1" dirty="0" err="1">
+                  <a:solidFill>
+                    <a:prstClr val="black"/>
+                  </a:solidFill>
+                  <a:latin typeface="Helvetica Light Oblique" panose="020B0403020202020204" pitchFamily="34" charset="0"/>
+                </a:rPr>
+                <a:t>leucocephalos</a:t>
+              </a:r>
+              <a:endParaRPr lang="en-US" sz="800" i="1" dirty="0">
+                <a:solidFill>
+                  <a:prstClr val="black"/>
+                </a:solidFill>
+                <a:latin typeface="Helvetica Light Oblique" panose="020B0403020202020204" pitchFamily="34" charset="0"/>
+              </a:endParaRPr>
+            </a:p>
+            <a:p>
+              <a:pPr marL="114300" indent="-114300">
+                <a:buSzPct val="150000"/>
+                <a:defRPr/>
+              </a:pPr>
+              <a:r>
+                <a:rPr lang="en-US" sz="800" i="1" dirty="0">
+                  <a:solidFill>
+                    <a:prstClr val="black"/>
+                  </a:solidFill>
+                  <a:latin typeface="Helvetica Light Oblique" panose="020B0403020202020204" pitchFamily="34" charset="0"/>
+                </a:rPr>
+                <a:t>    E. </a:t>
+              </a:r>
+              <a:r>
+                <a:rPr lang="en-US" sz="800" i="1" dirty="0">
+                  <a:solidFill>
+                    <a:prstClr val="black"/>
+                  </a:solidFill>
+                  <a:latin typeface="Helvetica Light Oblique" panose="020B0403020202020204" pitchFamily="34" charset="0"/>
+                </a:rPr>
+                <a:t>elegans</a:t>
+              </a:r>
+            </a:p>
+            <a:p>
+              <a:pPr marL="114300" indent="-114300">
+                <a:buSzPct val="150000"/>
+                <a:buFont typeface="Arial" panose="020B0604020202020204" pitchFamily="34" charset="0"/>
+                <a:buChar char="•"/>
+                <a:defRPr/>
+              </a:pPr>
+              <a:r>
+                <a:rPr lang="en-US" sz="800" i="1" dirty="0">
+                  <a:solidFill>
+                    <a:prstClr val="black"/>
+                  </a:solidFill>
+                  <a:latin typeface="Helvetica Light Oblique" panose="020B0403020202020204" pitchFamily="34" charset="0"/>
+                </a:rPr>
+                <a:t>P. </a:t>
+              </a:r>
+              <a:r>
+                <a:rPr lang="en-US" sz="800" i="1" dirty="0" err="1">
+                  <a:solidFill>
+                    <a:prstClr val="black"/>
+                  </a:solidFill>
+                  <a:latin typeface="Helvetica Light Oblique" panose="020B0403020202020204" pitchFamily="34" charset="0"/>
+                </a:rPr>
+                <a:t>crassirostris</a:t>
+              </a:r>
+              <a:endParaRPr lang="en-US" sz="800" i="1" dirty="0">
+                <a:solidFill>
+                  <a:prstClr val="black"/>
+                </a:solidFill>
+                <a:latin typeface="Helvetica Light Oblique" panose="020B0403020202020204" pitchFamily="34" charset="0"/>
+              </a:endParaRPr>
+            </a:p>
+          </p:txBody>
+        </p:sp>
+        <p:sp>
+          <p:nvSpPr>
+            <p:cNvPr id="25" name="TextBox 24">
+              <a:extLst>
+                <a:ext uri="{FF2B5EF4-FFF2-40B4-BE49-F238E27FC236}">
+                  <a16:creationId xmlns:a16="http://schemas.microsoft.com/office/drawing/2014/main" id="{8484D642-BE02-763F-DC5D-DAAF8CA8F3F2}"/>
+                </a:ext>
+              </a:extLst>
+            </p:cNvPr>
+            <p:cNvSpPr txBox="1"/>
+            <p:nvPr/>
+          </p:nvSpPr>
+          <p:spPr>
+            <a:xfrm>
+              <a:off x="-1982848" y="109738"/>
               <a:ext cx="1445295" cy="830997"/>
             </a:xfrm>
             <a:prstGeom prst="rect">
@@ -4307,20 +4505,9 @@
               </a:endParaRPr>
             </a:p>
             <a:p>
-              <a:pPr marL="58738" indent="-46038">
-                <a:buFont typeface="Arial" panose="020B0604020202020204" pitchFamily="34" charset="0"/>
-                <a:buChar char="•"/>
+              <a:pPr marL="12700">
                 <a:defRPr/>
               </a:pPr>
-              <a:r>
-                <a:rPr lang="en-US" sz="800" b="1" i="1" dirty="0" err="1">
-                  <a:solidFill>
-                    <a:prstClr val="black"/>
-                  </a:solidFill>
-                  <a:latin typeface="HELVETICA LIGHT OBLIQUE" panose="020B0403020202020204" pitchFamily="34" charset="0"/>
-                </a:rPr>
-                <a:t>Emberiza</a:t>
-              </a:r>
               <a:r>
                 <a:rPr lang="en-US" sz="800" b="1" i="1" dirty="0">
                   <a:solidFill>
@@ -4328,7 +4515,34 @@
                   </a:solidFill>
                   <a:latin typeface="HELVETICA LIGHT OBLIQUE" panose="020B0403020202020204" pitchFamily="34" charset="0"/>
                 </a:rPr>
-                <a:t> elegans</a:t>
+                <a:t>*</a:t>
+              </a:r>
+              <a:r>
+                <a:rPr lang="en-US" sz="800" i="1" dirty="0" err="1">
+                  <a:solidFill>
+                    <a:prstClr val="black"/>
+                  </a:solidFill>
+                  <a:latin typeface="Helvetica Light Oblique" panose="020B0403020202020204" pitchFamily="34" charset="0"/>
+                </a:rPr>
+                <a:t>Emberiza</a:t>
+              </a:r>
+              <a:r>
+                <a:rPr lang="en-US" sz="800" i="1" dirty="0">
+                  <a:solidFill>
+                    <a:prstClr val="black"/>
+                  </a:solidFill>
+                  <a:latin typeface="Helvetica Light Oblique" panose="020B0403020202020204" pitchFamily="34" charset="0"/>
+                </a:rPr>
+                <a:t> </a:t>
+              </a:r>
+              <a:r>
+                <a:rPr lang="en-US" sz="800" i="1" dirty="0">
+                  <a:solidFill>
+                    <a:prstClr val="black"/>
+                  </a:solidFill>
+                  <a:latin typeface="Helvetica Light Oblique" panose="020B0403020202020204" pitchFamily="34" charset="0"/>
+                </a:rPr>
+                <a:t>elegans</a:t>
               </a:r>
             </a:p>
             <a:p>
@@ -4441,209 +4655,6 @@
             <a:pPr algn="ctr"/>
             <a:endParaRPr lang="en-US" sz="406" dirty="0">
               <a:latin typeface="Helvetica Light" panose="020B0403020202020204" pitchFamily="34" charset="0"/>
-            </a:endParaRPr>
-          </a:p>
-        </p:txBody>
-      </p:sp>
-      <p:sp>
-        <p:nvSpPr>
-          <p:cNvPr id="92" name="TextBox 91">
-            <a:extLst>
-              <a:ext uri="{FF2B5EF4-FFF2-40B4-BE49-F238E27FC236}">
-                <a16:creationId xmlns:a16="http://schemas.microsoft.com/office/drawing/2014/main" id="{11DEF1F2-224E-2636-B1DE-32298E9ADC2C}"/>
-              </a:ext>
-            </a:extLst>
-          </p:cNvPr>
-          <p:cNvSpPr txBox="1"/>
-          <p:nvPr/>
-        </p:nvSpPr>
-        <p:spPr>
-          <a:xfrm>
-            <a:off x="2555162" y="83069"/>
-            <a:ext cx="1344721" cy="830997"/>
-          </a:xfrm>
-          <a:prstGeom prst="rect">
-            <a:avLst/>
-          </a:prstGeom>
-          <a:noFill/>
-        </p:spPr>
-        <p:txBody>
-          <a:bodyPr wrap="square" rtlCol="0">
-            <a:spAutoFit/>
-          </a:bodyPr>
-          <a:lstStyle/>
-          <a:p>
-            <a:pPr marL="58738" indent="-39688">
-              <a:buFont typeface="Arial" panose="020B0604020202020204" pitchFamily="34" charset="0"/>
-              <a:buChar char="•"/>
-              <a:defRPr/>
-            </a:pPr>
-            <a:r>
-              <a:rPr lang="en-US" sz="800" i="1" dirty="0">
-                <a:solidFill>
-                  <a:prstClr val="black"/>
-                </a:solidFill>
-                <a:latin typeface="Helvetica Light Oblique" panose="020B0403020202020204" pitchFamily="34" charset="0"/>
-              </a:rPr>
-              <a:t>P. tibialis </a:t>
-            </a:r>
-          </a:p>
-          <a:p>
-            <a:pPr marL="58738" indent="-39688">
-              <a:buFont typeface="Arial" panose="020B0604020202020204" pitchFamily="34" charset="0"/>
-              <a:buChar char="•"/>
-              <a:defRPr/>
-            </a:pPr>
-            <a:r>
-              <a:rPr lang="en-US" sz="800" i="1" dirty="0">
-                <a:solidFill>
-                  <a:prstClr val="black"/>
-                </a:solidFill>
-                <a:latin typeface="Helvetica Light Oblique" panose="020B0403020202020204" pitchFamily="34" charset="0"/>
-              </a:rPr>
-              <a:t>R. </a:t>
-            </a:r>
-            <a:r>
-              <a:rPr lang="en-US" sz="800" i="1" dirty="0" err="1">
-                <a:solidFill>
-                  <a:prstClr val="black"/>
-                </a:solidFill>
-                <a:latin typeface="Helvetica Light Oblique" panose="020B0403020202020204" pitchFamily="34" charset="0"/>
-              </a:rPr>
-              <a:t>celaeno</a:t>
-            </a:r>
-            <a:endParaRPr lang="en-US" sz="800" i="1" dirty="0">
-              <a:solidFill>
-                <a:prstClr val="black"/>
-              </a:solidFill>
-              <a:latin typeface="Helvetica Light Oblique" panose="020B0403020202020204" pitchFamily="34" charset="0"/>
-            </a:endParaRPr>
-          </a:p>
-          <a:p>
-            <a:pPr marL="58738" indent="-39688">
-              <a:buFont typeface="Arial" panose="020B0604020202020204" pitchFamily="34" charset="0"/>
-              <a:buChar char="•"/>
-              <a:defRPr/>
-            </a:pPr>
-            <a:r>
-              <a:rPr lang="en-US" sz="800" i="1" dirty="0">
-                <a:solidFill>
-                  <a:prstClr val="black"/>
-                </a:solidFill>
-                <a:latin typeface="Helvetica Light Oblique" panose="020B0403020202020204" pitchFamily="34" charset="0"/>
-              </a:rPr>
-              <a:t>E. </a:t>
-            </a:r>
-            <a:r>
-              <a:rPr lang="en-US" sz="800" i="1" dirty="0" err="1">
-                <a:solidFill>
-                  <a:prstClr val="black"/>
-                </a:solidFill>
-                <a:latin typeface="Helvetica Light Oblique" panose="020B0403020202020204" pitchFamily="34" charset="0"/>
-              </a:rPr>
-              <a:t>citrinella</a:t>
-            </a:r>
-            <a:endParaRPr lang="en-US" sz="800" i="1" dirty="0">
-              <a:solidFill>
-                <a:prstClr val="black"/>
-              </a:solidFill>
-              <a:latin typeface="Helvetica Light Oblique" panose="020B0403020202020204" pitchFamily="34" charset="0"/>
-            </a:endParaRPr>
-          </a:p>
-          <a:p>
-            <a:pPr marL="58738" indent="-39688">
-              <a:buFont typeface="Arial" panose="020B0604020202020204" pitchFamily="34" charset="0"/>
-              <a:buChar char="•"/>
-              <a:defRPr/>
-            </a:pPr>
-            <a:r>
-              <a:rPr lang="en-US" sz="800" i="1" dirty="0">
-                <a:solidFill>
-                  <a:prstClr val="black"/>
-                </a:solidFill>
-                <a:latin typeface="Helvetica Light Oblique" panose="020B0403020202020204" pitchFamily="34" charset="0"/>
-              </a:rPr>
-              <a:t>E. </a:t>
-            </a:r>
-            <a:r>
-              <a:rPr lang="en-US" sz="800" i="1" dirty="0" err="1">
-                <a:solidFill>
-                  <a:prstClr val="black"/>
-                </a:solidFill>
-                <a:latin typeface="Helvetica Light Oblique" panose="020B0403020202020204" pitchFamily="34" charset="0"/>
-              </a:rPr>
-              <a:t>leucocephalos</a:t>
-            </a:r>
-            <a:endParaRPr lang="en-US" sz="800" i="1" dirty="0">
-              <a:solidFill>
-                <a:prstClr val="black"/>
-              </a:solidFill>
-              <a:latin typeface="Helvetica Light Oblique" panose="020B0403020202020204" pitchFamily="34" charset="0"/>
-            </a:endParaRPr>
-          </a:p>
-          <a:p>
-            <a:pPr marL="58738" indent="-39688">
-              <a:buFont typeface="Arial" panose="020B0604020202020204" pitchFamily="34" charset="0"/>
-              <a:buChar char="•"/>
-              <a:defRPr/>
-            </a:pPr>
-            <a:r>
-              <a:rPr lang="en-US" sz="800" i="1" dirty="0">
-                <a:solidFill>
-                  <a:prstClr val="black"/>
-                </a:solidFill>
-                <a:latin typeface="Helvetica Light Oblique" panose="020B0403020202020204" pitchFamily="34" charset="0"/>
-              </a:rPr>
-              <a:t> </a:t>
-            </a:r>
-            <a:r>
-              <a:rPr lang="en-US" sz="800" b="1" i="1" dirty="0" err="1">
-                <a:solidFill>
-                  <a:prstClr val="black"/>
-                </a:solidFill>
-                <a:latin typeface="HELVETICA LIGHT OBLIQUE" panose="020B0403020202020204" pitchFamily="34" charset="0"/>
-              </a:rPr>
-              <a:t>Schoeniclus</a:t>
-            </a:r>
-            <a:r>
-              <a:rPr lang="en-US" sz="800" b="1" i="1" dirty="0">
-                <a:solidFill>
-                  <a:prstClr val="black"/>
-                </a:solidFill>
-                <a:latin typeface="Helvetica Light Oblique" panose="020B0403020202020204" pitchFamily="34" charset="0"/>
-              </a:rPr>
-              <a:t> elegans</a:t>
-            </a:r>
-          </a:p>
-          <a:p>
-            <a:pPr marL="58738" indent="-39688">
-              <a:buFont typeface="Arial" panose="020B0604020202020204" pitchFamily="34" charset="0"/>
-              <a:buChar char="•"/>
-              <a:defRPr/>
-            </a:pPr>
-            <a:r>
-              <a:rPr lang="en-US" sz="800" i="1" dirty="0">
-                <a:solidFill>
-                  <a:prstClr val="black"/>
-                </a:solidFill>
-                <a:latin typeface="Helvetica Light Oblique" panose="020B0403020202020204" pitchFamily="34" charset="0"/>
-              </a:rPr>
-              <a:t>P. </a:t>
-            </a:r>
-            <a:r>
-              <a:rPr lang="en-US" sz="800" i="1" dirty="0" err="1">
-                <a:solidFill>
-                  <a:prstClr val="black"/>
-                </a:solidFill>
-                <a:latin typeface="Helvetica Light Oblique" panose="020B0403020202020204" pitchFamily="34" charset="0"/>
-              </a:rPr>
-              <a:t>crassirostris</a:t>
-            </a:r>
-            <a:endParaRPr lang="en-US" sz="800" i="1" dirty="0">
-              <a:solidFill>
-                <a:prstClr val="black"/>
-              </a:solidFill>
-              <a:latin typeface="Helvetica Light Oblique" panose="020B0403020202020204" pitchFamily="34" charset="0"/>
             </a:endParaRPr>
           </a:p>
         </p:txBody>
@@ -8425,7 +8436,7 @@
         </p:blipFill>
         <p:spPr bwMode="auto">
           <a:xfrm>
-            <a:off x="4395605" y="871307"/>
+            <a:off x="4430774" y="847861"/>
             <a:ext cx="548640" cy="283337"/>
           </a:xfrm>
           <a:prstGeom prst="rect">
@@ -8443,6 +8454,274 @@
           </a:extLst>
         </p:spPr>
       </p:pic>
+      <p:sp>
+        <p:nvSpPr>
+          <p:cNvPr id="27" name="TextBox 26">
+            <a:extLst>
+              <a:ext uri="{FF2B5EF4-FFF2-40B4-BE49-F238E27FC236}">
+                <a16:creationId xmlns:a16="http://schemas.microsoft.com/office/drawing/2014/main" id="{584F09F7-662D-94E6-2F4A-8F355255C5ED}"/>
+              </a:ext>
+            </a:extLst>
+          </p:cNvPr>
+          <p:cNvSpPr txBox="1"/>
+          <p:nvPr/>
+        </p:nvSpPr>
+        <p:spPr>
+          <a:xfrm>
+            <a:off x="440199" y="574074"/>
+            <a:ext cx="248786" cy="246221"/>
+          </a:xfrm>
+          <a:prstGeom prst="rect">
+            <a:avLst/>
+          </a:prstGeom>
+          <a:noFill/>
+        </p:spPr>
+        <p:txBody>
+          <a:bodyPr wrap="none" rtlCol="0">
+            <a:spAutoFit/>
+          </a:bodyPr>
+          <a:lstStyle/>
+          <a:p>
+            <a:r>
+              <a:rPr lang="en-US" sz="1000" dirty="0"/>
+              <a:t>*</a:t>
+            </a:r>
+          </a:p>
+        </p:txBody>
+      </p:sp>
+      <p:sp>
+        <p:nvSpPr>
+          <p:cNvPr id="28" name="TextBox 27">
+            <a:extLst>
+              <a:ext uri="{FF2B5EF4-FFF2-40B4-BE49-F238E27FC236}">
+                <a16:creationId xmlns:a16="http://schemas.microsoft.com/office/drawing/2014/main" id="{DFB5AB4C-591E-1CC9-31E1-21133A16125C}"/>
+              </a:ext>
+            </a:extLst>
+          </p:cNvPr>
+          <p:cNvSpPr txBox="1"/>
+          <p:nvPr/>
+        </p:nvSpPr>
+        <p:spPr>
+          <a:xfrm>
+            <a:off x="2602380" y="71820"/>
+            <a:ext cx="1445295" cy="830997"/>
+          </a:xfrm>
+          <a:prstGeom prst="rect">
+            <a:avLst/>
+          </a:prstGeom>
+          <a:noFill/>
+        </p:spPr>
+        <p:txBody>
+          <a:bodyPr wrap="square" rtlCol="0">
+            <a:spAutoFit/>
+          </a:bodyPr>
+          <a:lstStyle/>
+          <a:p>
+            <a:pPr marL="114300" indent="-114300">
+              <a:buSzPct val="150000"/>
+              <a:buFont typeface="Arial" panose="020B0604020202020204" pitchFamily="34" charset="0"/>
+              <a:buChar char="•"/>
+              <a:defRPr/>
+            </a:pPr>
+            <a:r>
+              <a:rPr lang="en-US" sz="800" i="1" dirty="0">
+                <a:solidFill>
+                  <a:prstClr val="black"/>
+                </a:solidFill>
+                <a:latin typeface="Helvetica Light Oblique" panose="020B0403020202020204" pitchFamily="34" charset="0"/>
+              </a:rPr>
+              <a:t>P. tibialis </a:t>
+            </a:r>
+          </a:p>
+          <a:p>
+            <a:pPr marL="114300" indent="-114300">
+              <a:buSzPct val="150000"/>
+              <a:buFont typeface="Arial" panose="020B0604020202020204" pitchFamily="34" charset="0"/>
+              <a:buChar char="•"/>
+              <a:defRPr/>
+            </a:pPr>
+            <a:r>
+              <a:rPr lang="en-US" sz="800" i="1" dirty="0">
+                <a:solidFill>
+                  <a:prstClr val="black"/>
+                </a:solidFill>
+                <a:latin typeface="Helvetica Light Oblique" panose="020B0403020202020204" pitchFamily="34" charset="0"/>
+              </a:rPr>
+              <a:t>R. </a:t>
+            </a:r>
+            <a:r>
+              <a:rPr lang="en-US" sz="800" i="1" dirty="0" err="1">
+                <a:solidFill>
+                  <a:prstClr val="black"/>
+                </a:solidFill>
+                <a:latin typeface="Helvetica Light Oblique" panose="020B0403020202020204" pitchFamily="34" charset="0"/>
+              </a:rPr>
+              <a:t>celaeno</a:t>
+            </a:r>
+            <a:endParaRPr lang="en-US" sz="800" i="1" dirty="0">
+              <a:solidFill>
+                <a:prstClr val="black"/>
+              </a:solidFill>
+              <a:latin typeface="Helvetica Light Oblique" panose="020B0403020202020204" pitchFamily="34" charset="0"/>
+            </a:endParaRPr>
+          </a:p>
+          <a:p>
+            <a:pPr marL="114300" indent="-114300">
+              <a:buSzPct val="150000"/>
+              <a:buFont typeface="Arial" panose="020B0604020202020204" pitchFamily="34" charset="0"/>
+              <a:buChar char="•"/>
+              <a:defRPr/>
+            </a:pPr>
+            <a:r>
+              <a:rPr lang="en-US" sz="800" i="1" dirty="0">
+                <a:solidFill>
+                  <a:prstClr val="black"/>
+                </a:solidFill>
+                <a:latin typeface="Helvetica Light Oblique" panose="020B0403020202020204" pitchFamily="34" charset="0"/>
+              </a:rPr>
+              <a:t>E. </a:t>
+            </a:r>
+            <a:r>
+              <a:rPr lang="en-US" sz="800" i="1" dirty="0" err="1">
+                <a:solidFill>
+                  <a:prstClr val="black"/>
+                </a:solidFill>
+                <a:latin typeface="Helvetica Light Oblique" panose="020B0403020202020204" pitchFamily="34" charset="0"/>
+              </a:rPr>
+              <a:t>citrinella</a:t>
+            </a:r>
+            <a:endParaRPr lang="en-US" sz="800" i="1" dirty="0">
+              <a:solidFill>
+                <a:prstClr val="black"/>
+              </a:solidFill>
+              <a:latin typeface="Helvetica Light Oblique" panose="020B0403020202020204" pitchFamily="34" charset="0"/>
+            </a:endParaRPr>
+          </a:p>
+          <a:p>
+            <a:pPr marL="114300" indent="-114300">
+              <a:buSzPct val="150000"/>
+              <a:buFont typeface="Arial" panose="020B0604020202020204" pitchFamily="34" charset="0"/>
+              <a:buChar char="•"/>
+              <a:defRPr/>
+            </a:pPr>
+            <a:r>
+              <a:rPr lang="en-US" sz="800" i="1" dirty="0">
+                <a:solidFill>
+                  <a:prstClr val="black"/>
+                </a:solidFill>
+                <a:latin typeface="Helvetica Light Oblique" panose="020B0403020202020204" pitchFamily="34" charset="0"/>
+              </a:rPr>
+              <a:t>E. </a:t>
+            </a:r>
+            <a:r>
+              <a:rPr lang="en-US" sz="800" i="1" dirty="0" err="1">
+                <a:solidFill>
+                  <a:prstClr val="black"/>
+                </a:solidFill>
+                <a:latin typeface="Helvetica Light Oblique" panose="020B0403020202020204" pitchFamily="34" charset="0"/>
+              </a:rPr>
+              <a:t>leucocephalos</a:t>
+            </a:r>
+            <a:endParaRPr lang="en-US" sz="800" i="1" dirty="0">
+              <a:solidFill>
+                <a:prstClr val="black"/>
+              </a:solidFill>
+              <a:latin typeface="Helvetica Light Oblique" panose="020B0403020202020204" pitchFamily="34" charset="0"/>
+            </a:endParaRPr>
+          </a:p>
+          <a:p>
+            <a:pPr marL="114300" indent="-114300">
+              <a:buSzPct val="150000"/>
+              <a:defRPr/>
+            </a:pPr>
+            <a:r>
+              <a:rPr lang="en-US" sz="800" i="1" dirty="0">
+                <a:solidFill>
+                  <a:prstClr val="black"/>
+                </a:solidFill>
+                <a:latin typeface="Helvetica Light Oblique" panose="020B0403020202020204" pitchFamily="34" charset="0"/>
+              </a:rPr>
+              <a:t>    S. </a:t>
+            </a:r>
+            <a:r>
+              <a:rPr lang="en-US" sz="800" i="1" dirty="0">
+                <a:solidFill>
+                  <a:prstClr val="black"/>
+                </a:solidFill>
+                <a:latin typeface="Helvetica Light Oblique" panose="020B0403020202020204" pitchFamily="34" charset="0"/>
+              </a:rPr>
+              <a:t>elegans</a:t>
+            </a:r>
+          </a:p>
+          <a:p>
+            <a:pPr marL="114300" indent="-114300">
+              <a:buSzPct val="150000"/>
+              <a:buFont typeface="Arial" panose="020B0604020202020204" pitchFamily="34" charset="0"/>
+              <a:buChar char="•"/>
+              <a:defRPr/>
+            </a:pPr>
+            <a:r>
+              <a:rPr lang="en-US" sz="800" i="1" dirty="0">
+                <a:solidFill>
+                  <a:prstClr val="black"/>
+                </a:solidFill>
+                <a:latin typeface="Helvetica Light Oblique" panose="020B0403020202020204" pitchFamily="34" charset="0"/>
+              </a:rPr>
+              <a:t>P. </a:t>
+            </a:r>
+            <a:r>
+              <a:rPr lang="en-US" sz="800" i="1" dirty="0" err="1">
+                <a:solidFill>
+                  <a:prstClr val="black"/>
+                </a:solidFill>
+                <a:latin typeface="Helvetica Light Oblique" panose="020B0403020202020204" pitchFamily="34" charset="0"/>
+              </a:rPr>
+              <a:t>crassirostris</a:t>
+            </a:r>
+            <a:endParaRPr lang="en-US" sz="800" i="1" dirty="0">
+              <a:solidFill>
+                <a:prstClr val="black"/>
+              </a:solidFill>
+              <a:latin typeface="Helvetica Light Oblique" panose="020B0403020202020204" pitchFamily="34" charset="0"/>
+            </a:endParaRPr>
+          </a:p>
+        </p:txBody>
+      </p:sp>
+      <p:sp>
+        <p:nvSpPr>
+          <p:cNvPr id="29" name="TextBox 28">
+            <a:extLst>
+              <a:ext uri="{FF2B5EF4-FFF2-40B4-BE49-F238E27FC236}">
+                <a16:creationId xmlns:a16="http://schemas.microsoft.com/office/drawing/2014/main" id="{6FDF37CC-E783-A086-8B00-73D87B18AE25}"/>
+              </a:ext>
+            </a:extLst>
+          </p:cNvPr>
+          <p:cNvSpPr txBox="1"/>
+          <p:nvPr/>
+        </p:nvSpPr>
+        <p:spPr>
+          <a:xfrm>
+            <a:off x="2600733" y="555059"/>
+            <a:ext cx="248786" cy="246221"/>
+          </a:xfrm>
+          <a:prstGeom prst="rect">
+            <a:avLst/>
+          </a:prstGeom>
+          <a:noFill/>
+        </p:spPr>
+        <p:txBody>
+          <a:bodyPr wrap="none" rtlCol="0">
+            <a:spAutoFit/>
+          </a:bodyPr>
+          <a:lstStyle/>
+          <a:p>
+            <a:r>
+              <a:rPr lang="en-US" sz="1000" dirty="0"/>
+              <a:t>*</a:t>
+            </a:r>
+          </a:p>
+        </p:txBody>
+      </p:sp>
     </p:spTree>
     <p:extLst>
       <p:ext uri="{BB962C8B-B14F-4D97-AF65-F5344CB8AC3E}">

</xml_diff>

<commit_message>
Edits from second review.
</commit_message>
<xml_diff>
--- a/figures/figure-small-example/figure3-cycle-no-bg.pptx
+++ b/figures/figure-small-example/figure3-cycle-no-bg.pptx
@@ -222,7 +222,7 @@
           <a:p>
             <a:fld id="{6EB7A7D9-E015-6D42-BCFD-33C7B660C884}" type="datetimeFigureOut">
               <a:rPr lang="en-US" smtClean="0"/>
-              <a:t>10/27/23</a:t>
+              <a:t>11/7/23</a:t>
             </a:fld>
             <a:endParaRPr lang="en-US"/>
           </a:p>
@@ -709,7 +709,7 @@
           <a:p>
             <a:fld id="{B4970447-8C83-B347-8B06-AB59AEB01EEB}" type="datetimeFigureOut">
               <a:rPr lang="en-US" smtClean="0"/>
-              <a:t>10/27/23</a:t>
+              <a:t>11/7/23</a:t>
             </a:fld>
             <a:endParaRPr lang="en-US"/>
           </a:p>
@@ -879,7 +879,7 @@
           <a:p>
             <a:fld id="{B4970447-8C83-B347-8B06-AB59AEB01EEB}" type="datetimeFigureOut">
               <a:rPr lang="en-US" smtClean="0"/>
-              <a:t>10/27/23</a:t>
+              <a:t>11/7/23</a:t>
             </a:fld>
             <a:endParaRPr lang="en-US"/>
           </a:p>
@@ -1059,7 +1059,7 @@
           <a:p>
             <a:fld id="{B4970447-8C83-B347-8B06-AB59AEB01EEB}" type="datetimeFigureOut">
               <a:rPr lang="en-US" smtClean="0"/>
-              <a:t>10/27/23</a:t>
+              <a:t>11/7/23</a:t>
             </a:fld>
             <a:endParaRPr lang="en-US"/>
           </a:p>
@@ -1229,7 +1229,7 @@
           <a:p>
             <a:fld id="{B4970447-8C83-B347-8B06-AB59AEB01EEB}" type="datetimeFigureOut">
               <a:rPr lang="en-US" smtClean="0"/>
-              <a:t>10/27/23</a:t>
+              <a:t>11/7/23</a:t>
             </a:fld>
             <a:endParaRPr lang="en-US"/>
           </a:p>
@@ -1473,7 +1473,7 @@
           <a:p>
             <a:fld id="{B4970447-8C83-B347-8B06-AB59AEB01EEB}" type="datetimeFigureOut">
               <a:rPr lang="en-US" smtClean="0"/>
-              <a:t>10/27/23</a:t>
+              <a:t>11/7/23</a:t>
             </a:fld>
             <a:endParaRPr lang="en-US"/>
           </a:p>
@@ -1705,7 +1705,7 @@
           <a:p>
             <a:fld id="{B4970447-8C83-B347-8B06-AB59AEB01EEB}" type="datetimeFigureOut">
               <a:rPr lang="en-US" smtClean="0"/>
-              <a:t>10/27/23</a:t>
+              <a:t>11/7/23</a:t>
             </a:fld>
             <a:endParaRPr lang="en-US"/>
           </a:p>
@@ -2072,7 +2072,7 @@
           <a:p>
             <a:fld id="{B4970447-8C83-B347-8B06-AB59AEB01EEB}" type="datetimeFigureOut">
               <a:rPr lang="en-US" smtClean="0"/>
-              <a:t>10/27/23</a:t>
+              <a:t>11/7/23</a:t>
             </a:fld>
             <a:endParaRPr lang="en-US"/>
           </a:p>
@@ -2190,7 +2190,7 @@
           <a:p>
             <a:fld id="{B4970447-8C83-B347-8B06-AB59AEB01EEB}" type="datetimeFigureOut">
               <a:rPr lang="en-US" smtClean="0"/>
-              <a:t>10/27/23</a:t>
+              <a:t>11/7/23</a:t>
             </a:fld>
             <a:endParaRPr lang="en-US"/>
           </a:p>
@@ -2285,7 +2285,7 @@
           <a:p>
             <a:fld id="{B4970447-8C83-B347-8B06-AB59AEB01EEB}" type="datetimeFigureOut">
               <a:rPr lang="en-US" smtClean="0"/>
-              <a:t>10/27/23</a:t>
+              <a:t>11/7/23</a:t>
             </a:fld>
             <a:endParaRPr lang="en-US"/>
           </a:p>
@@ -2562,7 +2562,7 @@
           <a:p>
             <a:fld id="{B4970447-8C83-B347-8B06-AB59AEB01EEB}" type="datetimeFigureOut">
               <a:rPr lang="en-US" smtClean="0"/>
-              <a:t>10/27/23</a:t>
+              <a:t>11/7/23</a:t>
             </a:fld>
             <a:endParaRPr lang="en-US"/>
           </a:p>
@@ -2819,7 +2819,7 @@
           <a:p>
             <a:fld id="{B4970447-8C83-B347-8B06-AB59AEB01EEB}" type="datetimeFigureOut">
               <a:rPr lang="en-US" smtClean="0"/>
-              <a:t>10/27/23</a:t>
+              <a:t>11/7/23</a:t>
             </a:fld>
             <a:endParaRPr lang="en-US"/>
           </a:p>
@@ -3032,7 +3032,7 @@
           <a:p>
             <a:fld id="{B4970447-8C83-B347-8B06-AB59AEB01EEB}" type="datetimeFigureOut">
               <a:rPr lang="en-US" smtClean="0"/>
-              <a:t>10/27/23</a:t>
+              <a:t>11/7/23</a:t>
             </a:fld>
             <a:endParaRPr lang="en-US"/>
           </a:p>
@@ -3634,7 +3634,7 @@
         <p:spPr>
           <a:xfrm>
             <a:off x="28190" y="1310933"/>
-            <a:ext cx="6147120" cy="4122021"/>
+            <a:ext cx="6046074" cy="3999607"/>
           </a:xfrm>
           <a:prstGeom prst="rect">
             <a:avLst/>
@@ -3726,7 +3726,7 @@
         </p:nvCxnSpPr>
         <p:spPr>
           <a:xfrm>
-            <a:off x="6600168" y="1183587"/>
+            <a:off x="6600168" y="1195310"/>
             <a:ext cx="0" cy="4682094"/>
           </a:xfrm>
           <a:prstGeom prst="straightConnector1">
@@ -3771,8 +3771,8 @@
         </p:nvCxnSpPr>
         <p:spPr>
           <a:xfrm>
-            <a:off x="1803433" y="481408"/>
-            <a:ext cx="603504" cy="0"/>
+            <a:off x="2002724" y="481408"/>
+            <a:ext cx="548640" cy="0"/>
           </a:xfrm>
           <a:prstGeom prst="straightConnector1">
             <a:avLst/>
@@ -3814,7 +3814,7 @@
         </p:nvSpPr>
         <p:spPr>
           <a:xfrm>
-            <a:off x="2369188" y="-2631"/>
+            <a:off x="2509864" y="44261"/>
             <a:ext cx="330540" cy="276999"/>
           </a:xfrm>
           <a:prstGeom prst="rect">
@@ -4037,10 +4037,10 @@
         </p:nvGrpSpPr>
         <p:grpSpPr>
           <a:xfrm>
-            <a:off x="-1595989" y="-1980"/>
-            <a:ext cx="3481483" cy="955846"/>
-            <a:chOff x="-1982848" y="-1980"/>
-            <a:chExt cx="3481483" cy="955846"/>
+            <a:off x="-1551430" y="33086"/>
+            <a:ext cx="3636215" cy="920780"/>
+            <a:chOff x="-2137580" y="33086"/>
+            <a:chExt cx="3636215" cy="920780"/>
           </a:xfrm>
         </p:grpSpPr>
         <p:sp>
@@ -4057,8 +4057,8 @@
           </p:nvSpPr>
           <p:spPr>
             <a:xfrm>
-              <a:off x="-62051" y="33086"/>
-              <a:ext cx="1470850" cy="920780"/>
+              <a:off x="180131" y="33086"/>
+              <a:ext cx="1228667" cy="920780"/>
             </a:xfrm>
             <a:prstGeom prst="rect">
               <a:avLst/>
@@ -4111,7 +4111,7 @@
           </p:nvSpPr>
           <p:spPr>
             <a:xfrm>
-              <a:off x="-111080" y="-1980"/>
+              <a:off x="135103" y="33189"/>
               <a:ext cx="320922" cy="276999"/>
             </a:xfrm>
             <a:prstGeom prst="rect">
@@ -4148,8 +4148,8 @@
           </p:nvSpPr>
           <p:spPr>
             <a:xfrm>
-              <a:off x="53340" y="89355"/>
-              <a:ext cx="1445295" cy="830997"/>
+              <a:off x="309901" y="89355"/>
+              <a:ext cx="1188734" cy="830997"/>
             </a:xfrm>
             <a:prstGeom prst="rect">
               <a:avLst/>
@@ -4286,16 +4286,7 @@
                   </a:solidFill>
                   <a:latin typeface="Helvetica Light Oblique" panose="020B0403020202020204" pitchFamily="34" charset="0"/>
                 </a:rPr>
-                <a:t>    E. </a:t>
-              </a:r>
-              <a:r>
-                <a:rPr lang="en-US" sz="800" i="1" dirty="0">
-                  <a:solidFill>
-                    <a:prstClr val="black"/>
-                  </a:solidFill>
-                  <a:latin typeface="Helvetica Light Oblique" panose="020B0403020202020204" pitchFamily="34" charset="0"/>
-                </a:rPr>
-                <a:t>elegans</a:t>
+                <a:t>    E. elegans</a:t>
               </a:r>
             </a:p>
             <a:p>
@@ -4346,7 +4337,7 @@
           </p:nvSpPr>
           <p:spPr>
             <a:xfrm>
-              <a:off x="-1982848" y="109738"/>
+              <a:off x="-2137580" y="65909"/>
               <a:ext cx="1445295" cy="830997"/>
             </a:xfrm>
             <a:prstGeom prst="rect">
@@ -4533,16 +4524,7 @@
                   </a:solidFill>
                   <a:latin typeface="Helvetica Light Oblique" panose="020B0403020202020204" pitchFamily="34" charset="0"/>
                 </a:rPr>
-                <a:t> </a:t>
-              </a:r>
-              <a:r>
-                <a:rPr lang="en-US" sz="800" i="1" dirty="0">
-                  <a:solidFill>
-                    <a:prstClr val="black"/>
-                  </a:solidFill>
-                  <a:latin typeface="Helvetica Light Oblique" panose="020B0403020202020204" pitchFamily="34" charset="0"/>
-                </a:rPr>
-                <a:t>elegans</a:t>
+                <a:t> elegans</a:t>
               </a:r>
             </a:p>
             <a:p>
@@ -4710,7 +4692,7 @@
         </p:nvCxnSpPr>
         <p:spPr>
           <a:xfrm flipH="1">
-            <a:off x="3079322" y="979706"/>
+            <a:off x="3208275" y="979706"/>
             <a:ext cx="0" cy="344176"/>
           </a:xfrm>
           <a:prstGeom prst="straightConnector1">
@@ -4865,8 +4847,8 @@
         </p:nvSpPr>
         <p:spPr>
           <a:xfrm>
-            <a:off x="2406710" y="31228"/>
-            <a:ext cx="1367313" cy="920780"/>
+            <a:off x="2547219" y="31228"/>
+            <a:ext cx="1273696" cy="920780"/>
           </a:xfrm>
           <a:prstGeom prst="rect">
             <a:avLst/>
@@ -4916,15 +4898,13 @@
           </p:cNvPr>
           <p:cNvCxnSpPr>
             <a:cxnSpLocks/>
-            <a:stCxn id="165" idx="3"/>
-            <a:endCxn id="73" idx="1"/>
           </p:cNvCxnSpPr>
           <p:nvPr/>
         </p:nvCxnSpPr>
         <p:spPr>
           <a:xfrm>
-            <a:off x="3774023" y="491618"/>
-            <a:ext cx="600857" cy="0"/>
+            <a:off x="3820915" y="491618"/>
+            <a:ext cx="548640" cy="0"/>
           </a:xfrm>
           <a:prstGeom prst="straightConnector1">
             <a:avLst/>
@@ -5112,8 +5092,8 @@
         </p:nvCxnSpPr>
         <p:spPr>
           <a:xfrm>
-            <a:off x="6175310" y="3371944"/>
-            <a:ext cx="233073" cy="2511266"/>
+            <a:off x="6074264" y="3310737"/>
+            <a:ext cx="334119" cy="2572473"/>
           </a:xfrm>
           <a:prstGeom prst="bentConnector2">
             <a:avLst/>
@@ -7762,8 +7742,8 @@
         </p:blipFill>
         <p:spPr>
           <a:xfrm>
-            <a:off x="602613" y="5764181"/>
-            <a:ext cx="945874" cy="412018"/>
+            <a:off x="602613" y="5683151"/>
+            <a:ext cx="1131896" cy="493048"/>
           </a:xfrm>
           <a:prstGeom prst="rect">
             <a:avLst/>
@@ -7797,8 +7777,8 @@
         </p:blipFill>
         <p:spPr>
           <a:xfrm>
-            <a:off x="436014" y="6341513"/>
-            <a:ext cx="1777620" cy="1109711"/>
+            <a:off x="259281" y="6288738"/>
+            <a:ext cx="1933174" cy="1206818"/>
           </a:xfrm>
           <a:prstGeom prst="rect">
             <a:avLst/>
@@ -8436,7 +8416,7 @@
         </p:blipFill>
         <p:spPr bwMode="auto">
           <a:xfrm>
-            <a:off x="4430774" y="847861"/>
+            <a:off x="4622869" y="39335"/>
             <a:ext cx="548640" cy="283337"/>
           </a:xfrm>
           <a:prstGeom prst="rect">
@@ -8468,7 +8448,7 @@
         </p:nvSpPr>
         <p:spPr>
           <a:xfrm>
-            <a:off x="440199" y="574074"/>
+            <a:off x="885673" y="574074"/>
             <a:ext cx="248786" cy="246221"/>
           </a:xfrm>
           <a:prstGeom prst="rect">
@@ -8503,7 +8483,7 @@
         </p:nvSpPr>
         <p:spPr>
           <a:xfrm>
-            <a:off x="2602380" y="71820"/>
+            <a:off x="2707887" y="71820"/>
             <a:ext cx="1445295" cy="830997"/>
           </a:xfrm>
           <a:prstGeom prst="rect">
@@ -8641,16 +8621,7 @@
                 </a:solidFill>
                 <a:latin typeface="Helvetica Light Oblique" panose="020B0403020202020204" pitchFamily="34" charset="0"/>
               </a:rPr>
-              <a:t>    S. </a:t>
-            </a:r>
-            <a:r>
-              <a:rPr lang="en-US" sz="800" i="1" dirty="0">
-                <a:solidFill>
-                  <a:prstClr val="black"/>
-                </a:solidFill>
-                <a:latin typeface="Helvetica Light Oblique" panose="020B0403020202020204" pitchFamily="34" charset="0"/>
-              </a:rPr>
-              <a:t>elegans</a:t>
+              <a:t>    S. elegans</a:t>
             </a:r>
           </a:p>
           <a:p>
@@ -8701,7 +8672,7 @@
         </p:nvSpPr>
         <p:spPr>
           <a:xfrm>
-            <a:off x="2600733" y="555059"/>
+            <a:off x="2706240" y="555059"/>
             <a:ext cx="248786" cy="246221"/>
           </a:xfrm>
           <a:prstGeom prst="rect">
@@ -8722,6 +8693,81 @@
           </a:p>
         </p:txBody>
       </p:sp>
+      <p:cxnSp>
+        <p:nvCxnSpPr>
+          <p:cNvPr id="32" name="Straight Arrow Connector 31">
+            <a:extLst>
+              <a:ext uri="{FF2B5EF4-FFF2-40B4-BE49-F238E27FC236}">
+                <a16:creationId xmlns:a16="http://schemas.microsoft.com/office/drawing/2014/main" id="{7E9A9436-3100-2DA5-A3F6-AF77245A9AAD}"/>
+              </a:ext>
+            </a:extLst>
+          </p:cNvPr>
+          <p:cNvCxnSpPr>
+            <a:cxnSpLocks/>
+          </p:cNvCxnSpPr>
+          <p:nvPr/>
+        </p:nvCxnSpPr>
+        <p:spPr>
+          <a:xfrm flipV="1">
+            <a:off x="4036580" y="1064810"/>
+            <a:ext cx="338300" cy="226994"/>
+          </a:xfrm>
+          <a:prstGeom prst="straightConnector1">
+            <a:avLst/>
+          </a:prstGeom>
+          <a:ln w="19050">
+            <a:solidFill>
+              <a:schemeClr val="accent3"/>
+            </a:solidFill>
+            <a:headEnd type="oval"/>
+            <a:tailEnd type="arrow"/>
+          </a:ln>
+        </p:spPr>
+        <p:style>
+          <a:lnRef idx="1">
+            <a:schemeClr val="accent1"/>
+          </a:lnRef>
+          <a:fillRef idx="0">
+            <a:schemeClr val="accent1"/>
+          </a:fillRef>
+          <a:effectRef idx="0">
+            <a:schemeClr val="accent1"/>
+          </a:effectRef>
+          <a:fontRef idx="minor">
+            <a:schemeClr val="tx1"/>
+          </a:fontRef>
+        </p:style>
+      </p:cxnSp>
+      <p:pic>
+        <p:nvPicPr>
+          <p:cNvPr id="31" name="Picture 30" descr="A green lines on a black background&#10;&#10;Description automatically generated">
+            <a:extLst>
+              <a:ext uri="{FF2B5EF4-FFF2-40B4-BE49-F238E27FC236}">
+                <a16:creationId xmlns:a16="http://schemas.microsoft.com/office/drawing/2014/main" id="{BE1AB28D-8990-FE70-1BED-082DBF506DC4}"/>
+              </a:ext>
+            </a:extLst>
+          </p:cNvPr>
+          <p:cNvPicPr>
+            <a:picLocks noChangeAspect="1"/>
+          </p:cNvPicPr>
+          <p:nvPr/>
+        </p:nvPicPr>
+        <p:blipFill>
+          <a:blip r:embed="rId31"/>
+          <a:stretch>
+            <a:fillRect/>
+          </a:stretch>
+        </p:blipFill>
+        <p:spPr>
+          <a:xfrm>
+            <a:off x="20574" y="5416"/>
+            <a:ext cx="629173" cy="328979"/>
+          </a:xfrm>
+          <a:prstGeom prst="rect">
+            <a:avLst/>
+          </a:prstGeom>
+        </p:spPr>
+      </p:pic>
     </p:spTree>
     <p:extLst>
       <p:ext uri="{BB962C8B-B14F-4D97-AF65-F5344CB8AC3E}">

</xml_diff>